<commit_message>
feat: added updated powerpoint slides
</commit_message>
<xml_diff>
--- a/static/Husky Techtalk.pptx
+++ b/static/Husky Techtalk.pptx
@@ -13,6 +13,7 @@
     <p:sldId id="258" r:id="rId8"/>
     <p:sldId id="259" r:id="rId9"/>
     <p:sldId id="260" r:id="rId10"/>
+    <p:sldId id="261" r:id="rId11"/>
   </p:sldIdLst>
   <p:sldSz cy="5143500" cx="9144000"/>
   <p:notesSz cx="6858000" cy="9144000"/>
@@ -709,7 +710,7 @@
       </p:grpSpPr>
       <p:sp>
         <p:nvSpPr>
-          <p:cNvPr id="51" name="Google Shape;51;g2a6e5d6caa7_0_45:notes"/>
+          <p:cNvPr id="51" name="Google Shape;51;g2a67fbf590c_0_6:notes"/>
           <p:cNvSpPr/>
           <p:nvPr>
             <p:ph idx="2" type="sldImg"/>
@@ -744,7 +745,7 @@
       </p:sp>
       <p:sp>
         <p:nvSpPr>
-          <p:cNvPr id="52" name="Google Shape;52;g2a6e5d6caa7_0_45:notes"/>
+          <p:cNvPr id="52" name="Google Shape;52;g2a67fbf590c_0_6:notes"/>
           <p:cNvSpPr txBox="1"/>
           <p:nvPr>
             <p:ph idx="1" type="body"/>
@@ -794,7 +795,7 @@
   <p:cSld>
     <p:spTree>
       <p:nvGrpSpPr>
-        <p:cNvPr id="55" name="Shape 55"/>
+        <p:cNvPr id="59" name="Shape 59"/>
         <p:cNvGrpSpPr/>
         <p:nvPr/>
       </p:nvGrpSpPr>
@@ -808,7 +809,106 @@
       </p:grpSpPr>
       <p:sp>
         <p:nvSpPr>
-          <p:cNvPr id="56" name="Google Shape;56;p:notes"/>
+          <p:cNvPr id="60" name="Google Shape;60;g2a6e5d6caa7_0_45:notes"/>
+          <p:cNvSpPr/>
+          <p:nvPr>
+            <p:ph idx="2" type="sldImg"/>
+          </p:nvPr>
+        </p:nvSpPr>
+        <p:spPr>
+          <a:xfrm>
+            <a:off x="381300" y="685800"/>
+            <a:ext cx="6096000" cy="3429000"/>
+          </a:xfrm>
+          <a:custGeom>
+            <a:rect b="b" l="l" r="r" t="t"/>
+            <a:pathLst>
+              <a:path extrusionOk="0" h="120000" w="120000">
+                <a:moveTo>
+                  <a:pt x="0" y="0"/>
+                </a:moveTo>
+                <a:lnTo>
+                  <a:pt x="120000" y="0"/>
+                </a:lnTo>
+                <a:lnTo>
+                  <a:pt x="120000" y="120000"/>
+                </a:lnTo>
+                <a:lnTo>
+                  <a:pt x="0" y="120000"/>
+                </a:lnTo>
+                <a:close/>
+              </a:path>
+            </a:pathLst>
+          </a:custGeom>
+        </p:spPr>
+      </p:sp>
+      <p:sp>
+        <p:nvSpPr>
+          <p:cNvPr id="61" name="Google Shape;61;g2a6e5d6caa7_0_45:notes"/>
+          <p:cNvSpPr txBox="1"/>
+          <p:nvPr>
+            <p:ph idx="1" type="body"/>
+          </p:nvPr>
+        </p:nvSpPr>
+        <p:spPr>
+          <a:xfrm>
+            <a:off x="685800" y="4343400"/>
+            <a:ext cx="5486400" cy="4114800"/>
+          </a:xfrm>
+          <a:prstGeom prst="rect">
+            <a:avLst/>
+          </a:prstGeom>
+        </p:spPr>
+        <p:txBody>
+          <a:bodyPr anchorCtr="0" anchor="t" bIns="91425" lIns="91425" spcFirstLastPara="1" rIns="91425" wrap="square" tIns="91425">
+            <a:noAutofit/>
+          </a:bodyPr>
+          <a:lstStyle/>
+          <a:p>
+            <a:pPr indent="0" lvl="0" marL="0" rtl="0" algn="l">
+              <a:spcBef>
+                <a:spcPts val="0"/>
+              </a:spcBef>
+              <a:spcAft>
+                <a:spcPts val="0"/>
+              </a:spcAft>
+              <a:buNone/>
+            </a:pPr>
+            <a:r>
+              <a:t/>
+            </a:r>
+            <a:endParaRPr/>
+          </a:p>
+        </p:txBody>
+      </p:sp>
+    </p:spTree>
+  </p:cSld>
+  <p:clrMapOvr>
+    <a:masterClrMapping/>
+  </p:clrMapOvr>
+</p:notes>
+</file>
+
+<file path=ppt/notesSlides/notesSlide3.xml><?xml version="1.0" encoding="utf-8"?>
+<p:notes xmlns:a="http://schemas.openxmlformats.org/drawingml/2006/main" xmlns:r="http://schemas.openxmlformats.org/officeDocument/2006/relationships" xmlns:mc="http://schemas.openxmlformats.org/markup-compatibility/2006" xmlns:mv="urn:schemas-microsoft-com:mac:vml" xmlns:p="http://schemas.openxmlformats.org/presentationml/2006/main" xmlns:c="http://schemas.openxmlformats.org/drawingml/2006/chart" xmlns:dgm="http://schemas.openxmlformats.org/drawingml/2006/diagram" xmlns:o="urn:schemas-microsoft-com:office:office" xmlns:v="urn:schemas-microsoft-com:vml" xmlns:pvml="urn:schemas-microsoft-com:office:powerpoint" xmlns:com="http://schemas.openxmlformats.org/drawingml/2006/compatibility" xmlns:p14="http://schemas.microsoft.com/office/powerpoint/2010/main" xmlns:p15="http://schemas.microsoft.com/office/powerpoint/2012/main" xmlns:ahyp="http://schemas.microsoft.com/office/drawing/2018/hyperlinkcolor" showMasterPhAnim="0" showMasterSp="0">
+  <p:cSld>
+    <p:spTree>
+      <p:nvGrpSpPr>
+        <p:cNvPr id="64" name="Shape 64"/>
+        <p:cNvGrpSpPr/>
+        <p:nvPr/>
+      </p:nvGrpSpPr>
+      <p:grpSpPr>
+        <a:xfrm>
+          <a:off x="0" y="0"/>
+          <a:ext cx="0" cy="0"/>
+          <a:chOff x="0" y="0"/>
+          <a:chExt cx="0" cy="0"/>
+        </a:xfrm>
+      </p:grpSpPr>
+      <p:sp>
+        <p:nvSpPr>
+          <p:cNvPr id="65" name="Google Shape;65;p:notes"/>
           <p:cNvSpPr/>
           <p:nvPr>
             <p:ph idx="2" type="sldImg"/>
@@ -843,7 +943,7 @@
       </p:sp>
       <p:sp>
         <p:nvSpPr>
-          <p:cNvPr id="57" name="Google Shape;57;p:notes"/>
+          <p:cNvPr id="66" name="Google Shape;66;p:notes"/>
           <p:cNvSpPr txBox="1"/>
           <p:nvPr>
             <p:ph idx="1" type="body"/>
@@ -888,12 +988,12 @@
 </p:notes>
 </file>
 
-<file path=ppt/notesSlides/notesSlide3.xml><?xml version="1.0" encoding="utf-8"?>
+<file path=ppt/notesSlides/notesSlide4.xml><?xml version="1.0" encoding="utf-8"?>
 <p:notes xmlns:a="http://schemas.openxmlformats.org/drawingml/2006/main" xmlns:r="http://schemas.openxmlformats.org/officeDocument/2006/relationships" xmlns:mc="http://schemas.openxmlformats.org/markup-compatibility/2006" xmlns:mv="urn:schemas-microsoft-com:mac:vml" xmlns:p="http://schemas.openxmlformats.org/presentationml/2006/main" xmlns:c="http://schemas.openxmlformats.org/drawingml/2006/chart" xmlns:dgm="http://schemas.openxmlformats.org/drawingml/2006/diagram" xmlns:o="urn:schemas-microsoft-com:office:office" xmlns:v="urn:schemas-microsoft-com:vml" xmlns:pvml="urn:schemas-microsoft-com:office:powerpoint" xmlns:com="http://schemas.openxmlformats.org/drawingml/2006/compatibility" xmlns:p14="http://schemas.microsoft.com/office/powerpoint/2010/main" xmlns:p15="http://schemas.microsoft.com/office/powerpoint/2012/main" xmlns:ahyp="http://schemas.microsoft.com/office/drawing/2018/hyperlinkcolor" showMasterPhAnim="0" showMasterSp="0">
   <p:cSld>
     <p:spTree>
       <p:nvGrpSpPr>
-        <p:cNvPr id="61" name="Shape 61"/>
+        <p:cNvPr id="70" name="Shape 70"/>
         <p:cNvGrpSpPr/>
         <p:nvPr/>
       </p:nvGrpSpPr>
@@ -907,7 +1007,7 @@
       </p:grpSpPr>
       <p:sp>
         <p:nvSpPr>
-          <p:cNvPr id="62" name="Google Shape;62;g2a6e5d6caa7_0_52:notes"/>
+          <p:cNvPr id="71" name="Google Shape;71;g2a6e5d6caa7_0_52:notes"/>
           <p:cNvSpPr/>
           <p:nvPr>
             <p:ph idx="2" type="sldImg"/>
@@ -942,7 +1042,7 @@
       </p:sp>
       <p:sp>
         <p:nvSpPr>
-          <p:cNvPr id="63" name="Google Shape;63;g2a6e5d6caa7_0_52:notes"/>
+          <p:cNvPr id="72" name="Google Shape;72;g2a6e5d6caa7_0_52:notes"/>
           <p:cNvSpPr txBox="1"/>
           <p:nvPr>
             <p:ph idx="1" type="body"/>
@@ -987,12 +1087,12 @@
 </p:notes>
 </file>
 
-<file path=ppt/notesSlides/notesSlide4.xml><?xml version="1.0" encoding="utf-8"?>
+<file path=ppt/notesSlides/notesSlide5.xml><?xml version="1.0" encoding="utf-8"?>
 <p:notes xmlns:a="http://schemas.openxmlformats.org/drawingml/2006/main" xmlns:r="http://schemas.openxmlformats.org/officeDocument/2006/relationships" xmlns:mc="http://schemas.openxmlformats.org/markup-compatibility/2006" xmlns:mv="urn:schemas-microsoft-com:mac:vml" xmlns:p="http://schemas.openxmlformats.org/presentationml/2006/main" xmlns:c="http://schemas.openxmlformats.org/drawingml/2006/chart" xmlns:dgm="http://schemas.openxmlformats.org/drawingml/2006/diagram" xmlns:o="urn:schemas-microsoft-com:office:office" xmlns:v="urn:schemas-microsoft-com:vml" xmlns:pvml="urn:schemas-microsoft-com:office:powerpoint" xmlns:com="http://schemas.openxmlformats.org/drawingml/2006/compatibility" xmlns:p14="http://schemas.microsoft.com/office/powerpoint/2010/main" xmlns:p15="http://schemas.microsoft.com/office/powerpoint/2012/main" xmlns:ahyp="http://schemas.microsoft.com/office/drawing/2018/hyperlinkcolor" showMasterPhAnim="0" showMasterSp="0">
   <p:cSld>
     <p:spTree>
       <p:nvGrpSpPr>
-        <p:cNvPr id="68" name="Shape 68"/>
+        <p:cNvPr id="77" name="Shape 77"/>
         <p:cNvGrpSpPr/>
         <p:nvPr/>
       </p:nvGrpSpPr>
@@ -1006,7 +1106,7 @@
       </p:grpSpPr>
       <p:sp>
         <p:nvSpPr>
-          <p:cNvPr id="69" name="Google Shape;69;g2a6e5d6caa7_0_71:notes"/>
+          <p:cNvPr id="78" name="Google Shape;78;g2a6e5d6caa7_0_71:notes"/>
           <p:cNvSpPr/>
           <p:nvPr>
             <p:ph idx="2" type="sldImg"/>
@@ -1041,7 +1141,7 @@
       </p:sp>
       <p:sp>
         <p:nvSpPr>
-          <p:cNvPr id="70" name="Google Shape;70;g2a6e5d6caa7_0_71:notes"/>
+          <p:cNvPr id="79" name="Google Shape;79;g2a6e5d6caa7_0_71:notes"/>
           <p:cNvSpPr txBox="1"/>
           <p:nvPr>
             <p:ph idx="1" type="body"/>
@@ -1086,12 +1186,12 @@
 </p:notes>
 </file>
 
-<file path=ppt/notesSlides/notesSlide5.xml><?xml version="1.0" encoding="utf-8"?>
+<file path=ppt/notesSlides/notesSlide6.xml><?xml version="1.0" encoding="utf-8"?>
 <p:notes xmlns:a="http://schemas.openxmlformats.org/drawingml/2006/main" xmlns:r="http://schemas.openxmlformats.org/officeDocument/2006/relationships" xmlns:mc="http://schemas.openxmlformats.org/markup-compatibility/2006" xmlns:mv="urn:schemas-microsoft-com:mac:vml" xmlns:p="http://schemas.openxmlformats.org/presentationml/2006/main" xmlns:c="http://schemas.openxmlformats.org/drawingml/2006/chart" xmlns:dgm="http://schemas.openxmlformats.org/drawingml/2006/diagram" xmlns:o="urn:schemas-microsoft-com:office:office" xmlns:v="urn:schemas-microsoft-com:vml" xmlns:pvml="urn:schemas-microsoft-com:office:powerpoint" xmlns:com="http://schemas.openxmlformats.org/drawingml/2006/compatibility" xmlns:p14="http://schemas.microsoft.com/office/powerpoint/2010/main" xmlns:p15="http://schemas.microsoft.com/office/powerpoint/2012/main" xmlns:ahyp="http://schemas.microsoft.com/office/drawing/2018/hyperlinkcolor" showMasterPhAnim="0" showMasterSp="0">
   <p:cSld>
     <p:spTree>
       <p:nvGrpSpPr>
-        <p:cNvPr id="76" name="Shape 76"/>
+        <p:cNvPr id="85" name="Shape 85"/>
         <p:cNvGrpSpPr/>
         <p:nvPr/>
       </p:nvGrpSpPr>
@@ -1105,7 +1205,7 @@
       </p:grpSpPr>
       <p:sp>
         <p:nvSpPr>
-          <p:cNvPr id="77" name="Google Shape;77;g2a6e5d6caa7_0_80:notes"/>
+          <p:cNvPr id="86" name="Google Shape;86;g2a6e5d6caa7_0_80:notes"/>
           <p:cNvSpPr/>
           <p:nvPr>
             <p:ph idx="2" type="sldImg"/>
@@ -1140,7 +1240,7 @@
       </p:sp>
       <p:sp>
         <p:nvSpPr>
-          <p:cNvPr id="78" name="Google Shape;78;g2a6e5d6caa7_0_80:notes"/>
+          <p:cNvPr id="87" name="Google Shape;87;g2a6e5d6caa7_0_80:notes"/>
           <p:cNvSpPr txBox="1"/>
           <p:nvPr>
             <p:ph idx="1" type="body"/>
@@ -5914,9 +6014,487 @@
           <a:chExt cx="0" cy="0"/>
         </a:xfrm>
       </p:grpSpPr>
+      <p:sp>
+        <p:nvSpPr>
+          <p:cNvPr id="54" name="Google Shape;54;p13"/>
+          <p:cNvSpPr txBox="1"/>
+          <p:nvPr>
+            <p:ph type="title"/>
+          </p:nvPr>
+        </p:nvSpPr>
+        <p:spPr>
+          <a:xfrm>
+            <a:off x="311700" y="445025"/>
+            <a:ext cx="8520600" cy="572700"/>
+          </a:xfrm>
+          <a:prstGeom prst="rect">
+            <a:avLst/>
+          </a:prstGeom>
+        </p:spPr>
+        <p:txBody>
+          <a:bodyPr anchorCtr="0" anchor="t" bIns="91425" lIns="91425" spcFirstLastPara="1" rIns="91425" wrap="square" tIns="91425">
+            <a:normAutofit fontScale="90000"/>
+          </a:bodyPr>
+          <a:lstStyle/>
+          <a:p>
+            <a:pPr indent="0" lvl="0" marL="0" rtl="0" algn="l">
+              <a:spcBef>
+                <a:spcPts val="0"/>
+              </a:spcBef>
+              <a:spcAft>
+                <a:spcPts val="0"/>
+              </a:spcAft>
+              <a:buNone/>
+            </a:pPr>
+            <a:r>
+              <a:rPr lang="de"/>
+              <a:t>Introduction</a:t>
+            </a:r>
+            <a:endParaRPr/>
+          </a:p>
+        </p:txBody>
+      </p:sp>
+      <p:sp>
+        <p:nvSpPr>
+          <p:cNvPr id="55" name="Google Shape;55;p13"/>
+          <p:cNvSpPr txBox="1"/>
+          <p:nvPr>
+            <p:ph idx="1" type="body"/>
+          </p:nvPr>
+        </p:nvSpPr>
+        <p:spPr>
+          <a:xfrm>
+            <a:off x="311700" y="1152475"/>
+            <a:ext cx="5788200" cy="3416400"/>
+          </a:xfrm>
+          <a:prstGeom prst="rect">
+            <a:avLst/>
+          </a:prstGeom>
+        </p:spPr>
+        <p:txBody>
+          <a:bodyPr anchorCtr="0" anchor="t" bIns="91425" lIns="91425" spcFirstLastPara="1" rIns="91425" wrap="square" tIns="91425">
+            <a:normAutofit/>
+          </a:bodyPr>
+          <a:lstStyle/>
+          <a:p>
+            <a:pPr indent="-342900" lvl="0" marL="457200" rtl="0" algn="l">
+              <a:spcBef>
+                <a:spcPts val="0"/>
+              </a:spcBef>
+              <a:spcAft>
+                <a:spcPts val="0"/>
+              </a:spcAft>
+              <a:buSzPts val="1800"/>
+              <a:buChar char="-"/>
+            </a:pPr>
+            <a:r>
+              <a:rPr lang="de"/>
+              <a:t>Daniel Jancar</a:t>
+            </a:r>
+            <a:endParaRPr/>
+          </a:p>
+          <a:p>
+            <a:pPr indent="-342900" lvl="0" marL="457200" rtl="0" algn="l">
+              <a:spcBef>
+                <a:spcPts val="0"/>
+              </a:spcBef>
+              <a:spcAft>
+                <a:spcPts val="0"/>
+              </a:spcAft>
+              <a:buSzPts val="1800"/>
+              <a:buChar char="-"/>
+            </a:pPr>
+            <a:r>
+              <a:rPr lang="de"/>
+              <a:t>17-years old</a:t>
+            </a:r>
+            <a:endParaRPr/>
+          </a:p>
+          <a:p>
+            <a:pPr indent="-342900" lvl="0" marL="457200" rtl="0" algn="l">
+              <a:spcBef>
+                <a:spcPts val="0"/>
+              </a:spcBef>
+              <a:spcAft>
+                <a:spcPts val="0"/>
+              </a:spcAft>
+              <a:buSzPts val="1800"/>
+              <a:buChar char="-"/>
+            </a:pPr>
+            <a:r>
+              <a:rPr lang="de"/>
+              <a:t>Angular, Fullstack &amp;&amp; tech </a:t>
+            </a:r>
+            <a:r>
+              <a:rPr lang="de"/>
+              <a:t>enthusiast</a:t>
+            </a:r>
+            <a:endParaRPr/>
+          </a:p>
+          <a:p>
+            <a:pPr indent="0" lvl="0" marL="0" rtl="0" algn="l">
+              <a:spcBef>
+                <a:spcPts val="1200"/>
+              </a:spcBef>
+              <a:spcAft>
+                <a:spcPts val="1200"/>
+              </a:spcAft>
+              <a:buNone/>
+            </a:pPr>
+            <a:r>
+              <a:t/>
+            </a:r>
+            <a:endParaRPr/>
+          </a:p>
+        </p:txBody>
+      </p:sp>
+      <p:grpSp>
+        <p:nvGrpSpPr>
+          <p:cNvPr id="56" name="Google Shape;56;p13"/>
+          <p:cNvGrpSpPr/>
+          <p:nvPr/>
+        </p:nvGrpSpPr>
+        <p:grpSpPr>
+          <a:xfrm>
+            <a:off x="266412" y="4004700"/>
+            <a:ext cx="3246888" cy="564173"/>
+            <a:chOff x="2867350" y="3105800"/>
+            <a:chExt cx="3246888" cy="564173"/>
+          </a:xfrm>
+        </p:grpSpPr>
+        <p:pic>
+          <p:nvPicPr>
+            <p:cNvPr id="57" name="Google Shape;57;p13"/>
+            <p:cNvPicPr preferRelativeResize="0"/>
+            <p:nvPr/>
+          </p:nvPicPr>
+          <p:blipFill>
+            <a:blip r:embed="rId3">
+              <a:alphaModFix/>
+            </a:blip>
+            <a:stretch>
+              <a:fillRect/>
+            </a:stretch>
+          </p:blipFill>
+          <p:spPr>
+            <a:xfrm>
+              <a:off x="2867350" y="3105800"/>
+              <a:ext cx="564173" cy="564173"/>
+            </a:xfrm>
+            <a:prstGeom prst="rect">
+              <a:avLst/>
+            </a:prstGeom>
+            <a:noFill/>
+            <a:ln>
+              <a:noFill/>
+            </a:ln>
+          </p:spPr>
+        </p:pic>
+        <p:sp>
+          <p:nvSpPr>
+            <p:cNvPr id="58" name="Google Shape;58;p13"/>
+            <p:cNvSpPr txBox="1"/>
+            <p:nvPr/>
+          </p:nvSpPr>
+          <p:spPr>
+            <a:xfrm>
+              <a:off x="3341038" y="3188100"/>
+              <a:ext cx="2773200" cy="399600"/>
+            </a:xfrm>
+            <a:prstGeom prst="rect">
+              <a:avLst/>
+            </a:prstGeom>
+            <a:noFill/>
+            <a:ln>
+              <a:noFill/>
+            </a:ln>
+          </p:spPr>
+          <p:txBody>
+            <a:bodyPr anchorCtr="0" anchor="t" bIns="91425" lIns="91425" spcFirstLastPara="1" rIns="91425" wrap="square" tIns="91425">
+              <a:noAutofit/>
+            </a:bodyPr>
+            <a:lstStyle/>
+            <a:p>
+              <a:pPr indent="0" lvl="0" marL="0" rtl="0" algn="l">
+                <a:spcBef>
+                  <a:spcPts val="0"/>
+                </a:spcBef>
+                <a:spcAft>
+                  <a:spcPts val="0"/>
+                </a:spcAft>
+                <a:buNone/>
+              </a:pPr>
+              <a:r>
+                <a:rPr lang="de" sz="1800">
+                  <a:solidFill>
+                    <a:schemeClr val="lt2"/>
+                  </a:solidFill>
+                </a:rPr>
+                <a:t>danieljancar</a:t>
+              </a:r>
+              <a:endParaRPr sz="1800">
+                <a:solidFill>
+                  <a:schemeClr val="lt2"/>
+                </a:solidFill>
+              </a:endParaRPr>
+            </a:p>
+          </p:txBody>
+        </p:sp>
+      </p:grpSp>
+    </p:spTree>
+  </p:cSld>
+  <p:clrMapOvr>
+    <a:masterClrMapping/>
+  </p:clrMapOvr>
+  <p:timing>
+    <p:tnLst>
+      <p:par>
+        <p:cTn dur="indefinite" nodeType="tmRoot" restart="never">
+          <p:childTnLst>
+            <p:seq concurrent="1" nextAc="seek">
+              <p:cTn dur="indefinite" id="2" nodeType="mainSeq">
+                <p:childTnLst>
+                  <p:par>
+                    <p:cTn fill="hold">
+                      <p:stCondLst>
+                        <p:cond delay="indefinite"/>
+                      </p:stCondLst>
+                      <p:childTnLst>
+                        <p:par>
+                          <p:cTn fill="hold">
+                            <p:stCondLst>
+                              <p:cond delay="0"/>
+                            </p:stCondLst>
+                            <p:childTnLst>
+                              <p:par>
+                                <p:cTn fill="hold" nodeType="clickEffect" presetClass="entr" presetID="1" presetSubtype="0">
+                                  <p:stCondLst>
+                                    <p:cond delay="0"/>
+                                  </p:stCondLst>
+                                  <p:childTnLst>
+                                    <p:set>
+                                      <p:cBhvr>
+                                        <p:cTn dur="1" fill="hold">
+                                          <p:stCondLst>
+                                            <p:cond delay="0"/>
+                                          </p:stCondLst>
+                                        </p:cTn>
+                                        <p:tgtEl>
+                                          <p:spTgt spid="55">
+                                            <p:txEl>
+                                              <p:pRg end="0" st="0"/>
+                                            </p:txEl>
+                                          </p:spTgt>
+                                        </p:tgtEl>
+                                        <p:attrNameLst>
+                                          <p:attrName>style.visibility</p:attrName>
+                                        </p:attrNameLst>
+                                      </p:cBhvr>
+                                      <p:to>
+                                        <p:strVal val="visible"/>
+                                      </p:to>
+                                    </p:set>
+                                  </p:childTnLst>
+                                </p:cTn>
+                              </p:par>
+                            </p:childTnLst>
+                          </p:cTn>
+                        </p:par>
+                      </p:childTnLst>
+                    </p:cTn>
+                  </p:par>
+                  <p:par>
+                    <p:cTn fill="hold">
+                      <p:stCondLst>
+                        <p:cond delay="indefinite"/>
+                      </p:stCondLst>
+                      <p:childTnLst>
+                        <p:par>
+                          <p:cTn fill="hold">
+                            <p:stCondLst>
+                              <p:cond delay="0"/>
+                            </p:stCondLst>
+                            <p:childTnLst>
+                              <p:par>
+                                <p:cTn fill="hold" nodeType="clickEffect" presetClass="entr" presetID="1" presetSubtype="0">
+                                  <p:stCondLst>
+                                    <p:cond delay="0"/>
+                                  </p:stCondLst>
+                                  <p:childTnLst>
+                                    <p:set>
+                                      <p:cBhvr>
+                                        <p:cTn dur="1" fill="hold">
+                                          <p:stCondLst>
+                                            <p:cond delay="0"/>
+                                          </p:stCondLst>
+                                        </p:cTn>
+                                        <p:tgtEl>
+                                          <p:spTgt spid="55">
+                                            <p:txEl>
+                                              <p:pRg end="1" st="1"/>
+                                            </p:txEl>
+                                          </p:spTgt>
+                                        </p:tgtEl>
+                                        <p:attrNameLst>
+                                          <p:attrName>style.visibility</p:attrName>
+                                        </p:attrNameLst>
+                                      </p:cBhvr>
+                                      <p:to>
+                                        <p:strVal val="visible"/>
+                                      </p:to>
+                                    </p:set>
+                                  </p:childTnLst>
+                                </p:cTn>
+                              </p:par>
+                            </p:childTnLst>
+                          </p:cTn>
+                        </p:par>
+                      </p:childTnLst>
+                    </p:cTn>
+                  </p:par>
+                  <p:par>
+                    <p:cTn fill="hold">
+                      <p:stCondLst>
+                        <p:cond delay="indefinite"/>
+                      </p:stCondLst>
+                      <p:childTnLst>
+                        <p:par>
+                          <p:cTn fill="hold">
+                            <p:stCondLst>
+                              <p:cond delay="0"/>
+                            </p:stCondLst>
+                            <p:childTnLst>
+                              <p:par>
+                                <p:cTn fill="hold" nodeType="clickEffect" presetClass="entr" presetID="1" presetSubtype="0">
+                                  <p:stCondLst>
+                                    <p:cond delay="0"/>
+                                  </p:stCondLst>
+                                  <p:childTnLst>
+                                    <p:set>
+                                      <p:cBhvr>
+                                        <p:cTn dur="1" fill="hold">
+                                          <p:stCondLst>
+                                            <p:cond delay="0"/>
+                                          </p:stCondLst>
+                                        </p:cTn>
+                                        <p:tgtEl>
+                                          <p:spTgt spid="55">
+                                            <p:txEl>
+                                              <p:pRg end="2" st="2"/>
+                                            </p:txEl>
+                                          </p:spTgt>
+                                        </p:tgtEl>
+                                        <p:attrNameLst>
+                                          <p:attrName>style.visibility</p:attrName>
+                                        </p:attrNameLst>
+                                      </p:cBhvr>
+                                      <p:to>
+                                        <p:strVal val="visible"/>
+                                      </p:to>
+                                    </p:set>
+                                  </p:childTnLst>
+                                </p:cTn>
+                              </p:par>
+                            </p:childTnLst>
+                          </p:cTn>
+                        </p:par>
+                      </p:childTnLst>
+                    </p:cTn>
+                  </p:par>
+                  <p:par>
+                    <p:cTn fill="hold">
+                      <p:stCondLst>
+                        <p:cond delay="indefinite"/>
+                      </p:stCondLst>
+                      <p:childTnLst>
+                        <p:par>
+                          <p:cTn fill="hold">
+                            <p:stCondLst>
+                              <p:cond delay="0"/>
+                            </p:stCondLst>
+                            <p:childTnLst>
+                              <p:par>
+                                <p:cTn fill="hold" nodeType="clickEffect" presetClass="entr" presetID="1" presetSubtype="0">
+                                  <p:stCondLst>
+                                    <p:cond delay="0"/>
+                                  </p:stCondLst>
+                                  <p:childTnLst>
+                                    <p:set>
+                                      <p:cBhvr>
+                                        <p:cTn dur="1" fill="hold">
+                                          <p:stCondLst>
+                                            <p:cond delay="0"/>
+                                          </p:stCondLst>
+                                        </p:cTn>
+                                        <p:tgtEl>
+                                          <p:spTgt spid="55">
+                                            <p:txEl>
+                                              <p:pRg end="3" st="3"/>
+                                            </p:txEl>
+                                          </p:spTgt>
+                                        </p:tgtEl>
+                                        <p:attrNameLst>
+                                          <p:attrName>style.visibility</p:attrName>
+                                        </p:attrNameLst>
+                                      </p:cBhvr>
+                                      <p:to>
+                                        <p:strVal val="visible"/>
+                                      </p:to>
+                                    </p:set>
+                                  </p:childTnLst>
+                                </p:cTn>
+                              </p:par>
+                            </p:childTnLst>
+                          </p:cTn>
+                        </p:par>
+                      </p:childTnLst>
+                    </p:cTn>
+                  </p:par>
+                </p:childTnLst>
+              </p:cTn>
+              <p:prevCondLst>
+                <p:cond evt="onPrev">
+                  <p:tgtEl>
+                    <p:sldTgt/>
+                  </p:tgtEl>
+                </p:cond>
+              </p:prevCondLst>
+              <p:nextCondLst>
+                <p:cond evt="onNext">
+                  <p:tgtEl>
+                    <p:sldTgt/>
+                  </p:tgtEl>
+                </p:cond>
+              </p:nextCondLst>
+            </p:seq>
+          </p:childTnLst>
+        </p:cTn>
+      </p:par>
+    </p:tnLst>
+  </p:timing>
+</p:sld>
+</file>
+
+<file path=ppt/slides/slide2.xml><?xml version="1.0" encoding="utf-8"?>
+<p:sld xmlns:a="http://schemas.openxmlformats.org/drawingml/2006/main" xmlns:r="http://schemas.openxmlformats.org/officeDocument/2006/relationships" xmlns:mc="http://schemas.openxmlformats.org/markup-compatibility/2006" xmlns:mv="urn:schemas-microsoft-com:mac:vml" xmlns:p="http://schemas.openxmlformats.org/presentationml/2006/main" xmlns:c="http://schemas.openxmlformats.org/drawingml/2006/chart" xmlns:dgm="http://schemas.openxmlformats.org/drawingml/2006/diagram" xmlns:o="urn:schemas-microsoft-com:office:office" xmlns:v="urn:schemas-microsoft-com:vml" xmlns:pvml="urn:schemas-microsoft-com:office:powerpoint" xmlns:com="http://schemas.openxmlformats.org/drawingml/2006/compatibility" xmlns:p14="http://schemas.microsoft.com/office/powerpoint/2010/main" xmlns:p15="http://schemas.microsoft.com/office/powerpoint/2012/main" xmlns:ahyp="http://schemas.microsoft.com/office/drawing/2018/hyperlinkcolor">
+  <p:cSld>
+    <p:spTree>
+      <p:nvGrpSpPr>
+        <p:cNvPr id="62" name="Shape 62"/>
+        <p:cNvGrpSpPr/>
+        <p:nvPr/>
+      </p:nvGrpSpPr>
+      <p:grpSpPr>
+        <a:xfrm>
+          <a:off x="0" y="0"/>
+          <a:ext cx="0" cy="0"/>
+          <a:chOff x="0" y="0"/>
+          <a:chExt cx="0" cy="0"/>
+        </a:xfrm>
+      </p:grpSpPr>
       <p:pic>
         <p:nvPicPr>
-          <p:cNvPr id="54" name="Google Shape;54;p13"/>
+          <p:cNvPr id="63" name="Google Shape;63;p14"/>
           <p:cNvPicPr preferRelativeResize="0"/>
           <p:nvPr/>
         </p:nvPicPr>
@@ -5950,12 +6528,12 @@
 </p:sld>
 </file>
 
-<file path=ppt/slides/slide2.xml><?xml version="1.0" encoding="utf-8"?>
+<file path=ppt/slides/slide3.xml><?xml version="1.0" encoding="utf-8"?>
 <p:sld xmlns:a="http://schemas.openxmlformats.org/drawingml/2006/main" xmlns:r="http://schemas.openxmlformats.org/officeDocument/2006/relationships" xmlns:mc="http://schemas.openxmlformats.org/markup-compatibility/2006" xmlns:mv="urn:schemas-microsoft-com:mac:vml" xmlns:p="http://schemas.openxmlformats.org/presentationml/2006/main" xmlns:c="http://schemas.openxmlformats.org/drawingml/2006/chart" xmlns:dgm="http://schemas.openxmlformats.org/drawingml/2006/diagram" xmlns:o="urn:schemas-microsoft-com:office:office" xmlns:v="urn:schemas-microsoft-com:vml" xmlns:pvml="urn:schemas-microsoft-com:office:powerpoint" xmlns:com="http://schemas.openxmlformats.org/drawingml/2006/compatibility" xmlns:p14="http://schemas.microsoft.com/office/powerpoint/2010/main" xmlns:p15="http://schemas.microsoft.com/office/powerpoint/2012/main" xmlns:ahyp="http://schemas.microsoft.com/office/drawing/2018/hyperlinkcolor">
   <p:cSld>
     <p:spTree>
       <p:nvGrpSpPr>
-        <p:cNvPr id="58" name="Shape 58"/>
+        <p:cNvPr id="67" name="Shape 67"/>
         <p:cNvGrpSpPr/>
         <p:nvPr/>
       </p:nvGrpSpPr>
@@ -5969,7 +6547,7 @@
       </p:grpSpPr>
       <p:sp>
         <p:nvSpPr>
-          <p:cNvPr id="59" name="Google Shape;59;p14"/>
+          <p:cNvPr id="68" name="Google Shape;68;p15"/>
           <p:cNvSpPr txBox="1"/>
           <p:nvPr>
             <p:ph type="ctrTitle"/>
@@ -6009,7 +6587,7 @@
       </p:sp>
       <p:sp>
         <p:nvSpPr>
-          <p:cNvPr id="60" name="Google Shape;60;p14"/>
+          <p:cNvPr id="69" name="Google Shape;69;p15"/>
           <p:cNvSpPr txBox="1"/>
           <p:nvPr>
             <p:ph idx="1" type="subTitle"/>
@@ -6055,12 +6633,12 @@
 </p:sld>
 </file>
 
-<file path=ppt/slides/slide3.xml><?xml version="1.0" encoding="utf-8"?>
+<file path=ppt/slides/slide4.xml><?xml version="1.0" encoding="utf-8"?>
 <p:sld xmlns:a="http://schemas.openxmlformats.org/drawingml/2006/main" xmlns:r="http://schemas.openxmlformats.org/officeDocument/2006/relationships" xmlns:mc="http://schemas.openxmlformats.org/markup-compatibility/2006" xmlns:mv="urn:schemas-microsoft-com:mac:vml" xmlns:p="http://schemas.openxmlformats.org/presentationml/2006/main" xmlns:c="http://schemas.openxmlformats.org/drawingml/2006/chart" xmlns:dgm="http://schemas.openxmlformats.org/drawingml/2006/diagram" xmlns:o="urn:schemas-microsoft-com:office:office" xmlns:v="urn:schemas-microsoft-com:vml" xmlns:pvml="urn:schemas-microsoft-com:office:powerpoint" xmlns:com="http://schemas.openxmlformats.org/drawingml/2006/compatibility" xmlns:p14="http://schemas.microsoft.com/office/powerpoint/2010/main" xmlns:p15="http://schemas.microsoft.com/office/powerpoint/2012/main" xmlns:ahyp="http://schemas.microsoft.com/office/drawing/2018/hyperlinkcolor">
   <p:cSld>
     <p:spTree>
       <p:nvGrpSpPr>
-        <p:cNvPr id="64" name="Shape 64"/>
+        <p:cNvPr id="73" name="Shape 73"/>
         <p:cNvGrpSpPr/>
         <p:nvPr/>
       </p:nvGrpSpPr>
@@ -6074,7 +6652,7 @@
       </p:grpSpPr>
       <p:sp>
         <p:nvSpPr>
-          <p:cNvPr id="65" name="Google Shape;65;p15"/>
+          <p:cNvPr id="74" name="Google Shape;74;p16"/>
           <p:cNvSpPr txBox="1"/>
           <p:nvPr>
             <p:ph idx="1" type="body"/>
@@ -6293,7 +6871,7 @@
       </p:sp>
       <p:sp>
         <p:nvSpPr>
-          <p:cNvPr id="66" name="Google Shape;66;p15"/>
+          <p:cNvPr id="75" name="Google Shape;75;p16"/>
           <p:cNvSpPr txBox="1"/>
           <p:nvPr>
             <p:ph type="title"/>
@@ -6333,7 +6911,7 @@
       </p:sp>
       <p:pic>
         <p:nvPicPr>
-          <p:cNvPr id="67" name="Google Shape;67;p15"/>
+          <p:cNvPr id="76" name="Google Shape;76;p16"/>
           <p:cNvPicPr preferRelativeResize="0"/>
           <p:nvPr/>
         </p:nvPicPr>
@@ -6398,7 +6976,7 @@
                                           </p:stCondLst>
                                         </p:cTn>
                                         <p:tgtEl>
-                                          <p:spTgt spid="65">
+                                          <p:spTgt spid="74">
                                             <p:txEl>
                                               <p:pRg end="0" st="0"/>
                                             </p:txEl>
@@ -6447,7 +7025,7 @@
                                           </p:stCondLst>
                                         </p:cTn>
                                         <p:tgtEl>
-                                          <p:spTgt spid="65">
+                                          <p:spTgt spid="74">
                                             <p:txEl>
                                               <p:pRg end="1" st="1"/>
                                             </p:txEl>
@@ -6496,7 +7074,7 @@
                                           </p:stCondLst>
                                         </p:cTn>
                                         <p:tgtEl>
-                                          <p:spTgt spid="65">
+                                          <p:spTgt spid="74">
                                             <p:txEl>
                                               <p:pRg end="2" st="2"/>
                                             </p:txEl>
@@ -6545,7 +7123,7 @@
                                           </p:stCondLst>
                                         </p:cTn>
                                         <p:tgtEl>
-                                          <p:spTgt spid="65">
+                                          <p:spTgt spid="74">
                                             <p:txEl>
                                               <p:pRg end="3" st="3"/>
                                             </p:txEl>
@@ -6594,7 +7172,7 @@
                                           </p:stCondLst>
                                         </p:cTn>
                                         <p:tgtEl>
-                                          <p:spTgt spid="65">
+                                          <p:spTgt spid="74">
                                             <p:txEl>
                                               <p:pRg end="4" st="4"/>
                                             </p:txEl>
@@ -6643,7 +7221,7 @@
                                           </p:stCondLst>
                                         </p:cTn>
                                         <p:tgtEl>
-                                          <p:spTgt spid="65">
+                                          <p:spTgt spid="74">
                                             <p:txEl>
                                               <p:pRg end="5" st="5"/>
                                             </p:txEl>
@@ -6692,7 +7270,7 @@
                                           </p:stCondLst>
                                         </p:cTn>
                                         <p:tgtEl>
-                                          <p:spTgt spid="65">
+                                          <p:spTgt spid="74">
                                             <p:txEl>
                                               <p:pRg end="6" st="6"/>
                                             </p:txEl>
@@ -6741,7 +7319,7 @@
                                           </p:stCondLst>
                                         </p:cTn>
                                         <p:tgtEl>
-                                          <p:spTgt spid="65">
+                                          <p:spTgt spid="74">
                                             <p:txEl>
                                               <p:pRg end="7" st="7"/>
                                             </p:txEl>
@@ -6790,7 +7368,7 @@
                                           </p:stCondLst>
                                         </p:cTn>
                                         <p:tgtEl>
-                                          <p:spTgt spid="65">
+                                          <p:spTgt spid="74">
                                             <p:txEl>
                                               <p:pRg end="8" st="8"/>
                                             </p:txEl>
@@ -6839,7 +7417,7 @@
                                           </p:stCondLst>
                                         </p:cTn>
                                         <p:tgtEl>
-                                          <p:spTgt spid="65">
+                                          <p:spTgt spid="74">
                                             <p:txEl>
                                               <p:pRg end="9" st="9"/>
                                             </p:txEl>
@@ -6888,7 +7466,7 @@
                                           </p:stCondLst>
                                         </p:cTn>
                                         <p:tgtEl>
-                                          <p:spTgt spid="65">
+                                          <p:spTgt spid="74">
                                             <p:txEl>
                                               <p:pRg end="10" st="10"/>
                                             </p:txEl>
@@ -6936,12 +7514,12 @@
 </p:sld>
 </file>
 
-<file path=ppt/slides/slide4.xml><?xml version="1.0" encoding="utf-8"?>
+<file path=ppt/slides/slide5.xml><?xml version="1.0" encoding="utf-8"?>
 <p:sld xmlns:a="http://schemas.openxmlformats.org/drawingml/2006/main" xmlns:r="http://schemas.openxmlformats.org/officeDocument/2006/relationships" xmlns:mc="http://schemas.openxmlformats.org/markup-compatibility/2006" xmlns:mv="urn:schemas-microsoft-com:mac:vml" xmlns:p="http://schemas.openxmlformats.org/presentationml/2006/main" xmlns:c="http://schemas.openxmlformats.org/drawingml/2006/chart" xmlns:dgm="http://schemas.openxmlformats.org/drawingml/2006/diagram" xmlns:o="urn:schemas-microsoft-com:office:office" xmlns:v="urn:schemas-microsoft-com:vml" xmlns:pvml="urn:schemas-microsoft-com:office:powerpoint" xmlns:com="http://schemas.openxmlformats.org/drawingml/2006/compatibility" xmlns:p14="http://schemas.microsoft.com/office/powerpoint/2010/main" xmlns:p15="http://schemas.microsoft.com/office/powerpoint/2012/main" xmlns:ahyp="http://schemas.microsoft.com/office/drawing/2018/hyperlinkcolor">
   <p:cSld>
     <p:spTree>
       <p:nvGrpSpPr>
-        <p:cNvPr id="71" name="Shape 71"/>
+        <p:cNvPr id="80" name="Shape 80"/>
         <p:cNvGrpSpPr/>
         <p:nvPr/>
       </p:nvGrpSpPr>
@@ -6955,7 +7533,7 @@
       </p:grpSpPr>
       <p:sp>
         <p:nvSpPr>
-          <p:cNvPr id="72" name="Google Shape;72;p16"/>
+          <p:cNvPr id="81" name="Google Shape;81;p17"/>
           <p:cNvSpPr txBox="1"/>
           <p:nvPr>
             <p:ph type="title"/>
@@ -6995,13 +7573,13 @@
       </p:sp>
       <p:grpSp>
         <p:nvGrpSpPr>
-          <p:cNvPr id="73" name="Google Shape;73;p16"/>
+          <p:cNvPr id="82" name="Google Shape;82;p17"/>
           <p:cNvGrpSpPr/>
           <p:nvPr/>
         </p:nvGrpSpPr>
         <p:grpSpPr>
           <a:xfrm>
-            <a:off x="2841912" y="2902125"/>
+            <a:off x="2994312" y="3054525"/>
             <a:ext cx="3460175" cy="564173"/>
             <a:chOff x="2867350" y="3105800"/>
             <a:chExt cx="3460175" cy="564173"/>
@@ -7009,7 +7587,7 @@
         </p:grpSpPr>
         <p:pic>
           <p:nvPicPr>
-            <p:cNvPr id="74" name="Google Shape;74;p16"/>
+            <p:cNvPr id="83" name="Google Shape;83;p17"/>
             <p:cNvPicPr preferRelativeResize="0"/>
             <p:nvPr/>
           </p:nvPicPr>
@@ -7037,7 +7615,7 @@
         </p:pic>
         <p:sp>
           <p:nvSpPr>
-            <p:cNvPr id="75" name="Google Shape;75;p16"/>
+            <p:cNvPr id="84" name="Google Shape;84;p17"/>
             <p:cNvSpPr txBox="1"/>
             <p:nvPr/>
           </p:nvSpPr>
@@ -7094,12 +7672,12 @@
 </p:sld>
 </file>
 
-<file path=ppt/slides/slide5.xml><?xml version="1.0" encoding="utf-8"?>
+<file path=ppt/slides/slide6.xml><?xml version="1.0" encoding="utf-8"?>
 <p:sld xmlns:a="http://schemas.openxmlformats.org/drawingml/2006/main" xmlns:r="http://schemas.openxmlformats.org/officeDocument/2006/relationships" xmlns:mc="http://schemas.openxmlformats.org/markup-compatibility/2006" xmlns:mv="urn:schemas-microsoft-com:mac:vml" xmlns:p="http://schemas.openxmlformats.org/presentationml/2006/main" xmlns:c="http://schemas.openxmlformats.org/drawingml/2006/chart" xmlns:dgm="http://schemas.openxmlformats.org/drawingml/2006/diagram" xmlns:o="urn:schemas-microsoft-com:office:office" xmlns:v="urn:schemas-microsoft-com:vml" xmlns:pvml="urn:schemas-microsoft-com:office:powerpoint" xmlns:com="http://schemas.openxmlformats.org/drawingml/2006/compatibility" xmlns:p14="http://schemas.microsoft.com/office/powerpoint/2010/main" xmlns:p15="http://schemas.microsoft.com/office/powerpoint/2012/main" xmlns:ahyp="http://schemas.microsoft.com/office/drawing/2018/hyperlinkcolor">
   <p:cSld>
     <p:spTree>
       <p:nvGrpSpPr>
-        <p:cNvPr id="79" name="Shape 79"/>
+        <p:cNvPr id="88" name="Shape 88"/>
         <p:cNvGrpSpPr/>
         <p:nvPr/>
       </p:nvGrpSpPr>
@@ -7113,7 +7691,7 @@
       </p:grpSpPr>
       <p:sp>
         <p:nvSpPr>
-          <p:cNvPr id="80" name="Google Shape;80;p17"/>
+          <p:cNvPr id="89" name="Google Shape;89;p18"/>
           <p:cNvSpPr txBox="1"/>
           <p:nvPr>
             <p:ph type="ctrTitle"/>
@@ -7153,7 +7731,7 @@
       </p:sp>
       <p:sp>
         <p:nvSpPr>
-          <p:cNvPr id="81" name="Google Shape;81;p17"/>
+          <p:cNvPr id="90" name="Google Shape;90;p18"/>
           <p:cNvSpPr txBox="1"/>
           <p:nvPr>
             <p:ph idx="1" type="subTitle"/>
@@ -7200,6 +7778,285 @@
 </file>
 
 <file path=ppt/theme/theme1.xml><?xml version="1.0" encoding="utf-8"?>
+<a:theme xmlns:a="http://schemas.openxmlformats.org/drawingml/2006/main" xmlns:r="http://schemas.openxmlformats.org/officeDocument/2006/relationships" name="Simple Dark">
+  <a:themeElements>
+    <a:clrScheme name="Simple Dark">
+      <a:dk1>
+        <a:srgbClr val="FFFFFF"/>
+      </a:dk1>
+      <a:lt1>
+        <a:srgbClr val="212121"/>
+      </a:lt1>
+      <a:dk2>
+        <a:srgbClr val="303030"/>
+      </a:dk2>
+      <a:lt2>
+        <a:srgbClr val="ADADAD"/>
+      </a:lt2>
+      <a:accent1>
+        <a:srgbClr val="009688"/>
+      </a:accent1>
+      <a:accent2>
+        <a:srgbClr val="EEEEEE"/>
+      </a:accent2>
+      <a:accent3>
+        <a:srgbClr val="78909C"/>
+      </a:accent3>
+      <a:accent4>
+        <a:srgbClr val="FFAB40"/>
+      </a:accent4>
+      <a:accent5>
+        <a:srgbClr val="4DD0E1"/>
+      </a:accent5>
+      <a:accent6>
+        <a:srgbClr val="EEFF41"/>
+      </a:accent6>
+      <a:hlink>
+        <a:srgbClr val="4DD0E1"/>
+      </a:hlink>
+      <a:folHlink>
+        <a:srgbClr val="4DD0E1"/>
+      </a:folHlink>
+    </a:clrScheme>
+    <a:fontScheme name="Office">
+      <a:majorFont>
+        <a:latin typeface="Arial"/>
+        <a:ea typeface=""/>
+        <a:cs typeface=""/>
+        <a:font script="Jpan" typeface="ＭＳ Ｐゴシック"/>
+        <a:font script="Hang" typeface="맑은 고딕"/>
+        <a:font script="Hans" typeface="宋体"/>
+        <a:font script="Hant" typeface="新細明體"/>
+        <a:font script="Arab" typeface="Times New Roman"/>
+        <a:font script="Hebr" typeface="Times New Roman"/>
+        <a:font script="Thai" typeface="Angsana New"/>
+        <a:font script="Ethi" typeface="Nyala"/>
+        <a:font script="Beng" typeface="Vrinda"/>
+        <a:font script="Gujr" typeface="Shruti"/>
+        <a:font script="Khmr" typeface="MoolBoran"/>
+        <a:font script="Knda" typeface="Tunga"/>
+        <a:font script="Guru" typeface="Raavi"/>
+        <a:font script="Cans" typeface="Euphemia"/>
+        <a:font script="Cher" typeface="Plantagenet Cherokee"/>
+        <a:font script="Yiii" typeface="Microsoft Yi Baiti"/>
+        <a:font script="Tibt" typeface="Microsoft Himalaya"/>
+        <a:font script="Thaa" typeface="MV Boli"/>
+        <a:font script="Deva" typeface="Mangal"/>
+        <a:font script="Telu" typeface="Gautami"/>
+        <a:font script="Taml" typeface="Latha"/>
+        <a:font script="Syrc" typeface="Estrangelo Edessa"/>
+        <a:font script="Orya" typeface="Kalinga"/>
+        <a:font script="Mlym" typeface="Kartika"/>
+        <a:font script="Laoo" typeface="DokChampa"/>
+        <a:font script="Sinh" typeface="Iskoola Pota"/>
+        <a:font script="Mong" typeface="Mongolian Baiti"/>
+        <a:font script="Viet" typeface="Times New Roman"/>
+        <a:font script="Uigh" typeface="Microsoft Uighur"/>
+        <a:font script="Geor" typeface="Sylfaen"/>
+      </a:majorFont>
+      <a:minorFont>
+        <a:latin typeface="Arial"/>
+        <a:ea typeface=""/>
+        <a:cs typeface=""/>
+        <a:font script="Jpan" typeface="ＭＳ Ｐゴシック"/>
+        <a:font script="Hang" typeface="맑은 고딕"/>
+        <a:font script="Hans" typeface="宋体"/>
+        <a:font script="Hant" typeface="新細明體"/>
+        <a:font script="Arab" typeface="Arial"/>
+        <a:font script="Hebr" typeface="Arial"/>
+        <a:font script="Thai" typeface="Cordia New"/>
+        <a:font script="Ethi" typeface="Nyala"/>
+        <a:font script="Beng" typeface="Vrinda"/>
+        <a:font script="Gujr" typeface="Shruti"/>
+        <a:font script="Khmr" typeface="DaunPenh"/>
+        <a:font script="Knda" typeface="Tunga"/>
+        <a:font script="Guru" typeface="Raavi"/>
+        <a:font script="Cans" typeface="Euphemia"/>
+        <a:font script="Cher" typeface="Plantagenet Cherokee"/>
+        <a:font script="Yiii" typeface="Microsoft Yi Baiti"/>
+        <a:font script="Tibt" typeface="Microsoft Himalaya"/>
+        <a:font script="Thaa" typeface="MV Boli"/>
+        <a:font script="Deva" typeface="Mangal"/>
+        <a:font script="Telu" typeface="Gautami"/>
+        <a:font script="Taml" typeface="Latha"/>
+        <a:font script="Syrc" typeface="Estrangelo Edessa"/>
+        <a:font script="Orya" typeface="Kalinga"/>
+        <a:font script="Mlym" typeface="Kartika"/>
+        <a:font script="Laoo" typeface="DokChampa"/>
+        <a:font script="Sinh" typeface="Iskoola Pota"/>
+        <a:font script="Mong" typeface="Mongolian Baiti"/>
+        <a:font script="Viet" typeface="Arial"/>
+        <a:font script="Uigh" typeface="Microsoft Uighur"/>
+        <a:font script="Geor" typeface="Sylfaen"/>
+      </a:minorFont>
+    </a:fontScheme>
+    <a:fmtScheme name="Office">
+      <a:fillStyleLst>
+        <a:solidFill>
+          <a:schemeClr val="phClr"/>
+        </a:solidFill>
+        <a:gradFill rotWithShape="1">
+          <a:gsLst>
+            <a:gs pos="0">
+              <a:schemeClr val="phClr">
+                <a:tint val="50000"/>
+                <a:satMod val="300000"/>
+              </a:schemeClr>
+            </a:gs>
+            <a:gs pos="35000">
+              <a:schemeClr val="phClr">
+                <a:tint val="37000"/>
+                <a:satMod val="300000"/>
+              </a:schemeClr>
+            </a:gs>
+            <a:gs pos="100000">
+              <a:schemeClr val="phClr">
+                <a:tint val="15000"/>
+                <a:satMod val="350000"/>
+              </a:schemeClr>
+            </a:gs>
+          </a:gsLst>
+          <a:lin ang="16200000" scaled="1"/>
+        </a:gradFill>
+        <a:gradFill rotWithShape="1">
+          <a:gsLst>
+            <a:gs pos="0">
+              <a:schemeClr val="phClr">
+                <a:tint val="100000"/>
+                <a:shade val="100000"/>
+                <a:satMod val="130000"/>
+              </a:schemeClr>
+            </a:gs>
+            <a:gs pos="100000">
+              <a:schemeClr val="phClr">
+                <a:tint val="50000"/>
+                <a:shade val="100000"/>
+                <a:satMod val="350000"/>
+              </a:schemeClr>
+            </a:gs>
+          </a:gsLst>
+          <a:lin ang="16200000" scaled="0"/>
+        </a:gradFill>
+      </a:fillStyleLst>
+      <a:lnStyleLst>
+        <a:ln w="9525" cap="flat" cmpd="sng" algn="ctr">
+          <a:solidFill>
+            <a:schemeClr val="phClr">
+              <a:shade val="95000"/>
+              <a:satMod val="105000"/>
+            </a:schemeClr>
+          </a:solidFill>
+          <a:prstDash val="solid"/>
+        </a:ln>
+        <a:ln w="25400" cap="flat" cmpd="sng" algn="ctr">
+          <a:solidFill>
+            <a:schemeClr val="phClr"/>
+          </a:solidFill>
+          <a:prstDash val="solid"/>
+        </a:ln>
+        <a:ln w="38100" cap="flat" cmpd="sng" algn="ctr">
+          <a:solidFill>
+            <a:schemeClr val="phClr"/>
+          </a:solidFill>
+          <a:prstDash val="solid"/>
+        </a:ln>
+      </a:lnStyleLst>
+      <a:effectStyleLst>
+        <a:effectStyle>
+          <a:effectLst>
+            <a:outerShdw blurRad="40000" dist="20000" dir="5400000" rotWithShape="0">
+              <a:srgbClr val="000000">
+                <a:alpha val="38000"/>
+              </a:srgbClr>
+            </a:outerShdw>
+          </a:effectLst>
+        </a:effectStyle>
+        <a:effectStyle>
+          <a:effectLst>
+            <a:outerShdw blurRad="40000" dist="23000" dir="5400000" rotWithShape="0">
+              <a:srgbClr val="000000">
+                <a:alpha val="35000"/>
+              </a:srgbClr>
+            </a:outerShdw>
+          </a:effectLst>
+        </a:effectStyle>
+        <a:effectStyle>
+          <a:effectLst>
+            <a:outerShdw blurRad="40000" dist="23000" dir="5400000" rotWithShape="0">
+              <a:srgbClr val="000000">
+                <a:alpha val="35000"/>
+              </a:srgbClr>
+            </a:outerShdw>
+          </a:effectLst>
+          <a:scene3d>
+            <a:camera prst="orthographicFront">
+              <a:rot lat="0" lon="0" rev="0"/>
+            </a:camera>
+            <a:lightRig rig="threePt" dir="t">
+              <a:rot lat="0" lon="0" rev="1200000"/>
+            </a:lightRig>
+          </a:scene3d>
+          <a:sp3d>
+            <a:bevelT w="63500" h="25400"/>
+          </a:sp3d>
+        </a:effectStyle>
+      </a:effectStyleLst>
+      <a:bgFillStyleLst>
+        <a:solidFill>
+          <a:schemeClr val="phClr"/>
+        </a:solidFill>
+        <a:gradFill rotWithShape="1">
+          <a:gsLst>
+            <a:gs pos="0">
+              <a:schemeClr val="phClr">
+                <a:tint val="40000"/>
+                <a:satMod val="350000"/>
+              </a:schemeClr>
+            </a:gs>
+            <a:gs pos="40000">
+              <a:schemeClr val="phClr">
+                <a:tint val="45000"/>
+                <a:shade val="99000"/>
+                <a:satMod val="350000"/>
+              </a:schemeClr>
+            </a:gs>
+            <a:gs pos="100000">
+              <a:schemeClr val="phClr">
+                <a:shade val="20000"/>
+                <a:satMod val="255000"/>
+              </a:schemeClr>
+            </a:gs>
+          </a:gsLst>
+          <a:path path="circle">
+            <a:fillToRect l="50000" t="-80000" r="50000" b="180000"/>
+          </a:path>
+        </a:gradFill>
+        <a:gradFill rotWithShape="1">
+          <a:gsLst>
+            <a:gs pos="0">
+              <a:schemeClr val="phClr">
+                <a:tint val="80000"/>
+                <a:satMod val="300000"/>
+              </a:schemeClr>
+            </a:gs>
+            <a:gs pos="100000">
+              <a:schemeClr val="phClr">
+                <a:shade val="30000"/>
+                <a:satMod val="200000"/>
+              </a:schemeClr>
+            </a:gs>
+          </a:gsLst>
+          <a:path path="circle">
+            <a:fillToRect l="50000" t="50000" r="50000" b="50000"/>
+          </a:path>
+        </a:gradFill>
+      </a:bgFillStyleLst>
+    </a:fmtScheme>
+  </a:themeElements>
+</a:theme>
+</file>
+
+<file path=ppt/theme/theme2.xml><?xml version="1.0" encoding="utf-8"?>
 <a:theme xmlns:a="http://schemas.openxmlformats.org/drawingml/2006/main" xmlns:r="http://schemas.openxmlformats.org/officeDocument/2006/relationships">
   <a:themeElements>
     <a:clrScheme name="Default">
@@ -7476,283 +8333,4 @@
     </a:fmtScheme>
   </a:themeElements>
 </a:theme>
-</file>
-
-<file path=ppt/theme/theme2.xml><?xml version="1.0" encoding="utf-8"?>
-<a:theme xmlns:a="http://schemas.openxmlformats.org/drawingml/2006/main" xmlns:r="http://schemas.openxmlformats.org/officeDocument/2006/relationships" name="Simple Dark">
-  <a:themeElements>
-    <a:clrScheme name="Simple Dark">
-      <a:dk1>
-        <a:srgbClr val="FFFFFF"/>
-      </a:dk1>
-      <a:lt1>
-        <a:srgbClr val="212121"/>
-      </a:lt1>
-      <a:dk2>
-        <a:srgbClr val="303030"/>
-      </a:dk2>
-      <a:lt2>
-        <a:srgbClr val="ADADAD"/>
-      </a:lt2>
-      <a:accent1>
-        <a:srgbClr val="009688"/>
-      </a:accent1>
-      <a:accent2>
-        <a:srgbClr val="EEEEEE"/>
-      </a:accent2>
-      <a:accent3>
-        <a:srgbClr val="78909C"/>
-      </a:accent3>
-      <a:accent4>
-        <a:srgbClr val="FFAB40"/>
-      </a:accent4>
-      <a:accent5>
-        <a:srgbClr val="4DD0E1"/>
-      </a:accent5>
-      <a:accent6>
-        <a:srgbClr val="EEFF41"/>
-      </a:accent6>
-      <a:hlink>
-        <a:srgbClr val="4DD0E1"/>
-      </a:hlink>
-      <a:folHlink>
-        <a:srgbClr val="4DD0E1"/>
-      </a:folHlink>
-    </a:clrScheme>
-    <a:fontScheme name="Office">
-      <a:majorFont>
-        <a:latin typeface="Arial"/>
-        <a:ea typeface=""/>
-        <a:cs typeface=""/>
-        <a:font script="Jpan" typeface="ＭＳ Ｐゴシック"/>
-        <a:font script="Hang" typeface="맑은 고딕"/>
-        <a:font script="Hans" typeface="宋体"/>
-        <a:font script="Hant" typeface="新細明體"/>
-        <a:font script="Arab" typeface="Times New Roman"/>
-        <a:font script="Hebr" typeface="Times New Roman"/>
-        <a:font script="Thai" typeface="Angsana New"/>
-        <a:font script="Ethi" typeface="Nyala"/>
-        <a:font script="Beng" typeface="Vrinda"/>
-        <a:font script="Gujr" typeface="Shruti"/>
-        <a:font script="Khmr" typeface="MoolBoran"/>
-        <a:font script="Knda" typeface="Tunga"/>
-        <a:font script="Guru" typeface="Raavi"/>
-        <a:font script="Cans" typeface="Euphemia"/>
-        <a:font script="Cher" typeface="Plantagenet Cherokee"/>
-        <a:font script="Yiii" typeface="Microsoft Yi Baiti"/>
-        <a:font script="Tibt" typeface="Microsoft Himalaya"/>
-        <a:font script="Thaa" typeface="MV Boli"/>
-        <a:font script="Deva" typeface="Mangal"/>
-        <a:font script="Telu" typeface="Gautami"/>
-        <a:font script="Taml" typeface="Latha"/>
-        <a:font script="Syrc" typeface="Estrangelo Edessa"/>
-        <a:font script="Orya" typeface="Kalinga"/>
-        <a:font script="Mlym" typeface="Kartika"/>
-        <a:font script="Laoo" typeface="DokChampa"/>
-        <a:font script="Sinh" typeface="Iskoola Pota"/>
-        <a:font script="Mong" typeface="Mongolian Baiti"/>
-        <a:font script="Viet" typeface="Times New Roman"/>
-        <a:font script="Uigh" typeface="Microsoft Uighur"/>
-        <a:font script="Geor" typeface="Sylfaen"/>
-      </a:majorFont>
-      <a:minorFont>
-        <a:latin typeface="Arial"/>
-        <a:ea typeface=""/>
-        <a:cs typeface=""/>
-        <a:font script="Jpan" typeface="ＭＳ Ｐゴシック"/>
-        <a:font script="Hang" typeface="맑은 고딕"/>
-        <a:font script="Hans" typeface="宋体"/>
-        <a:font script="Hant" typeface="新細明體"/>
-        <a:font script="Arab" typeface="Arial"/>
-        <a:font script="Hebr" typeface="Arial"/>
-        <a:font script="Thai" typeface="Cordia New"/>
-        <a:font script="Ethi" typeface="Nyala"/>
-        <a:font script="Beng" typeface="Vrinda"/>
-        <a:font script="Gujr" typeface="Shruti"/>
-        <a:font script="Khmr" typeface="DaunPenh"/>
-        <a:font script="Knda" typeface="Tunga"/>
-        <a:font script="Guru" typeface="Raavi"/>
-        <a:font script="Cans" typeface="Euphemia"/>
-        <a:font script="Cher" typeface="Plantagenet Cherokee"/>
-        <a:font script="Yiii" typeface="Microsoft Yi Baiti"/>
-        <a:font script="Tibt" typeface="Microsoft Himalaya"/>
-        <a:font script="Thaa" typeface="MV Boli"/>
-        <a:font script="Deva" typeface="Mangal"/>
-        <a:font script="Telu" typeface="Gautami"/>
-        <a:font script="Taml" typeface="Latha"/>
-        <a:font script="Syrc" typeface="Estrangelo Edessa"/>
-        <a:font script="Orya" typeface="Kalinga"/>
-        <a:font script="Mlym" typeface="Kartika"/>
-        <a:font script="Laoo" typeface="DokChampa"/>
-        <a:font script="Sinh" typeface="Iskoola Pota"/>
-        <a:font script="Mong" typeface="Mongolian Baiti"/>
-        <a:font script="Viet" typeface="Arial"/>
-        <a:font script="Uigh" typeface="Microsoft Uighur"/>
-        <a:font script="Geor" typeface="Sylfaen"/>
-      </a:minorFont>
-    </a:fontScheme>
-    <a:fmtScheme name="Office">
-      <a:fillStyleLst>
-        <a:solidFill>
-          <a:schemeClr val="phClr"/>
-        </a:solidFill>
-        <a:gradFill rotWithShape="1">
-          <a:gsLst>
-            <a:gs pos="0">
-              <a:schemeClr val="phClr">
-                <a:tint val="50000"/>
-                <a:satMod val="300000"/>
-              </a:schemeClr>
-            </a:gs>
-            <a:gs pos="35000">
-              <a:schemeClr val="phClr">
-                <a:tint val="37000"/>
-                <a:satMod val="300000"/>
-              </a:schemeClr>
-            </a:gs>
-            <a:gs pos="100000">
-              <a:schemeClr val="phClr">
-                <a:tint val="15000"/>
-                <a:satMod val="350000"/>
-              </a:schemeClr>
-            </a:gs>
-          </a:gsLst>
-          <a:lin ang="16200000" scaled="1"/>
-        </a:gradFill>
-        <a:gradFill rotWithShape="1">
-          <a:gsLst>
-            <a:gs pos="0">
-              <a:schemeClr val="phClr">
-                <a:tint val="100000"/>
-                <a:shade val="100000"/>
-                <a:satMod val="130000"/>
-              </a:schemeClr>
-            </a:gs>
-            <a:gs pos="100000">
-              <a:schemeClr val="phClr">
-                <a:tint val="50000"/>
-                <a:shade val="100000"/>
-                <a:satMod val="350000"/>
-              </a:schemeClr>
-            </a:gs>
-          </a:gsLst>
-          <a:lin ang="16200000" scaled="0"/>
-        </a:gradFill>
-      </a:fillStyleLst>
-      <a:lnStyleLst>
-        <a:ln w="9525" cap="flat" cmpd="sng" algn="ctr">
-          <a:solidFill>
-            <a:schemeClr val="phClr">
-              <a:shade val="95000"/>
-              <a:satMod val="105000"/>
-            </a:schemeClr>
-          </a:solidFill>
-          <a:prstDash val="solid"/>
-        </a:ln>
-        <a:ln w="25400" cap="flat" cmpd="sng" algn="ctr">
-          <a:solidFill>
-            <a:schemeClr val="phClr"/>
-          </a:solidFill>
-          <a:prstDash val="solid"/>
-        </a:ln>
-        <a:ln w="38100" cap="flat" cmpd="sng" algn="ctr">
-          <a:solidFill>
-            <a:schemeClr val="phClr"/>
-          </a:solidFill>
-          <a:prstDash val="solid"/>
-        </a:ln>
-      </a:lnStyleLst>
-      <a:effectStyleLst>
-        <a:effectStyle>
-          <a:effectLst>
-            <a:outerShdw blurRad="40000" dist="20000" dir="5400000" rotWithShape="0">
-              <a:srgbClr val="000000">
-                <a:alpha val="38000"/>
-              </a:srgbClr>
-            </a:outerShdw>
-          </a:effectLst>
-        </a:effectStyle>
-        <a:effectStyle>
-          <a:effectLst>
-            <a:outerShdw blurRad="40000" dist="23000" dir="5400000" rotWithShape="0">
-              <a:srgbClr val="000000">
-                <a:alpha val="35000"/>
-              </a:srgbClr>
-            </a:outerShdw>
-          </a:effectLst>
-        </a:effectStyle>
-        <a:effectStyle>
-          <a:effectLst>
-            <a:outerShdw blurRad="40000" dist="23000" dir="5400000" rotWithShape="0">
-              <a:srgbClr val="000000">
-                <a:alpha val="35000"/>
-              </a:srgbClr>
-            </a:outerShdw>
-          </a:effectLst>
-          <a:scene3d>
-            <a:camera prst="orthographicFront">
-              <a:rot lat="0" lon="0" rev="0"/>
-            </a:camera>
-            <a:lightRig rig="threePt" dir="t">
-              <a:rot lat="0" lon="0" rev="1200000"/>
-            </a:lightRig>
-          </a:scene3d>
-          <a:sp3d>
-            <a:bevelT w="63500" h="25400"/>
-          </a:sp3d>
-        </a:effectStyle>
-      </a:effectStyleLst>
-      <a:bgFillStyleLst>
-        <a:solidFill>
-          <a:schemeClr val="phClr"/>
-        </a:solidFill>
-        <a:gradFill rotWithShape="1">
-          <a:gsLst>
-            <a:gs pos="0">
-              <a:schemeClr val="phClr">
-                <a:tint val="40000"/>
-                <a:satMod val="350000"/>
-              </a:schemeClr>
-            </a:gs>
-            <a:gs pos="40000">
-              <a:schemeClr val="phClr">
-                <a:tint val="45000"/>
-                <a:shade val="99000"/>
-                <a:satMod val="350000"/>
-              </a:schemeClr>
-            </a:gs>
-            <a:gs pos="100000">
-              <a:schemeClr val="phClr">
-                <a:shade val="20000"/>
-                <a:satMod val="255000"/>
-              </a:schemeClr>
-            </a:gs>
-          </a:gsLst>
-          <a:path path="circle">
-            <a:fillToRect l="50000" t="-80000" r="50000" b="180000"/>
-          </a:path>
-        </a:gradFill>
-        <a:gradFill rotWithShape="1">
-          <a:gsLst>
-            <a:gs pos="0">
-              <a:schemeClr val="phClr">
-                <a:tint val="80000"/>
-                <a:satMod val="300000"/>
-              </a:schemeClr>
-            </a:gs>
-            <a:gs pos="100000">
-              <a:schemeClr val="phClr">
-                <a:shade val="30000"/>
-                <a:satMod val="200000"/>
-              </a:schemeClr>
-            </a:gs>
-          </a:gsLst>
-          <a:path path="circle">
-            <a:fillToRect l="50000" t="50000" r="50000" b="50000"/>
-          </a:path>
-        </a:gradFill>
-      </a:bgFillStyleLst>
-    </a:fmtScheme>
-  </a:themeElements>
-</a:theme>
 </file>
</xml_diff>